<commit_message>
added questions; changed outputtext; fixed a logic bug in the quizsimulator class
</commit_message>
<xml_diff>
--- a/Quizduell.pptx
+++ b/Quizduell.pptx
@@ -5,7 +5,7 @@
     <p:sldMasterId id="2147483792" r:id="rId1"/>
   </p:sldMasterIdLst>
   <p:notesMasterIdLst>
-    <p:notesMasterId r:id="rId13"/>
+    <p:notesMasterId r:id="rId14"/>
   </p:notesMasterIdLst>
   <p:sldIdLst>
     <p:sldId id="256" r:id="rId2"/>
@@ -13,12 +13,13 @@
     <p:sldId id="258" r:id="rId4"/>
     <p:sldId id="259" r:id="rId5"/>
     <p:sldId id="260" r:id="rId6"/>
-    <p:sldId id="264" r:id="rId7"/>
-    <p:sldId id="265" r:id="rId8"/>
-    <p:sldId id="263" r:id="rId9"/>
-    <p:sldId id="261" r:id="rId10"/>
-    <p:sldId id="266" r:id="rId11"/>
-    <p:sldId id="262" r:id="rId12"/>
+    <p:sldId id="267" r:id="rId7"/>
+    <p:sldId id="264" r:id="rId8"/>
+    <p:sldId id="265" r:id="rId9"/>
+    <p:sldId id="263" r:id="rId10"/>
+    <p:sldId id="261" r:id="rId11"/>
+    <p:sldId id="266" r:id="rId12"/>
+    <p:sldId id="262" r:id="rId13"/>
   </p:sldIdLst>
   <p:sldSz cx="9144000" cy="6858000" type="screen4x3"/>
   <p:notesSz cx="6858000" cy="9144000"/>
@@ -558,6 +559,312 @@
 </p:notes>
 </file>
 
+<file path=ppt/notesSlides/notesSlide10.xml><?xml version="1.0" encoding="utf-8"?>
+<p:notes xmlns:a="http://schemas.openxmlformats.org/drawingml/2006/main" xmlns:r="http://schemas.openxmlformats.org/officeDocument/2006/relationships" xmlns:p="http://schemas.openxmlformats.org/presentationml/2006/main">
+  <p:cSld>
+    <p:spTree>
+      <p:nvGrpSpPr>
+        <p:cNvPr id="1" name=""/>
+        <p:cNvGrpSpPr/>
+        <p:nvPr/>
+      </p:nvGrpSpPr>
+      <p:grpSpPr>
+        <a:xfrm>
+          <a:off x="0" y="0"/>
+          <a:ext cx="0" cy="0"/>
+          <a:chOff x="0" y="0"/>
+          <a:chExt cx="0" cy="0"/>
+        </a:xfrm>
+      </p:grpSpPr>
+      <p:sp>
+        <p:nvSpPr>
+          <p:cNvPr id="2" name="Folienbildplatzhalter 1"/>
+          <p:cNvSpPr>
+            <a:spLocks noGrp="1" noRot="1" noChangeAspect="1"/>
+          </p:cNvSpPr>
+          <p:nvPr>
+            <p:ph type="sldImg"/>
+          </p:nvPr>
+        </p:nvSpPr>
+        <p:spPr/>
+      </p:sp>
+      <p:sp>
+        <p:nvSpPr>
+          <p:cNvPr id="3" name="Notizenplatzhalter 2"/>
+          <p:cNvSpPr>
+            <a:spLocks noGrp="1"/>
+          </p:cNvSpPr>
+          <p:nvPr>
+            <p:ph type="body" idx="1"/>
+          </p:nvPr>
+        </p:nvSpPr>
+        <p:spPr/>
+        <p:txBody>
+          <a:bodyPr/>
+          <a:lstStyle/>
+          <a:p>
+            <a:pPr marL="228600" indent="-228600">
+              <a:buAutoNum type="arabicPeriod"/>
+            </a:pPr>
+            <a:r>
+              <a:rPr lang="en-US" dirty="0" smtClean="0"/>
+              <a:t>Login</a:t>
+            </a:r>
+            <a:r>
+              <a:rPr lang="en-US" baseline="0" dirty="0" smtClean="0"/>
+              <a:t> </a:t>
+            </a:r>
+            <a:r>
+              <a:rPr lang="en-US" baseline="0" dirty="0" err="1" smtClean="0"/>
+              <a:t>überprüfen</a:t>
+            </a:r>
+            <a:endParaRPr lang="en-US" baseline="0" dirty="0" smtClean="0"/>
+          </a:p>
+          <a:p>
+            <a:pPr marL="228600" indent="-228600">
+              <a:buAutoNum type="arabicPeriod"/>
+            </a:pPr>
+            <a:r>
+              <a:rPr lang="en-US" baseline="0" dirty="0" smtClean="0"/>
+              <a:t>2. Login </a:t>
+            </a:r>
+            <a:r>
+              <a:rPr lang="en-US" baseline="0" dirty="0" err="1" smtClean="0"/>
+              <a:t>mit</a:t>
+            </a:r>
+            <a:r>
+              <a:rPr lang="en-US" baseline="0" dirty="0" smtClean="0"/>
+              <a:t> James</a:t>
+            </a:r>
+          </a:p>
+          <a:p>
+            <a:pPr marL="228600" indent="-228600">
+              <a:buAutoNum type="arabicPeriod"/>
+            </a:pPr>
+            <a:r>
+              <a:rPr lang="en-US" baseline="0" dirty="0" smtClean="0"/>
+              <a:t>Continue</a:t>
+            </a:r>
+          </a:p>
+          <a:p>
+            <a:pPr marL="228600" indent="-228600">
+              <a:buAutoNum type="arabicPeriod"/>
+            </a:pPr>
+            <a:r>
+              <a:rPr lang="en-US" baseline="0" dirty="0" smtClean="0"/>
+              <a:t>Display </a:t>
+            </a:r>
+            <a:r>
+              <a:rPr lang="en-US" baseline="0" dirty="0" err="1" smtClean="0"/>
+              <a:t>duells</a:t>
+            </a:r>
+            <a:endParaRPr lang="en-US" baseline="0" dirty="0" smtClean="0"/>
+          </a:p>
+          <a:p>
+            <a:pPr marL="228600" indent="-228600">
+              <a:buAutoNum type="arabicPeriod"/>
+            </a:pPr>
+            <a:r>
+              <a:rPr lang="en-US" baseline="0" dirty="0" smtClean="0"/>
+              <a:t>New </a:t>
+            </a:r>
+            <a:r>
+              <a:rPr lang="en-US" baseline="0" dirty="0" err="1" smtClean="0"/>
+              <a:t>duells</a:t>
+            </a:r>
+            <a:endParaRPr lang="en-US" baseline="0" dirty="0" smtClean="0"/>
+          </a:p>
+          <a:p>
+            <a:pPr marL="228600" indent="-228600">
+              <a:buAutoNum type="arabicPeriod" startAt="6"/>
+            </a:pPr>
+            <a:r>
+              <a:rPr lang="en-US" baseline="0" dirty="0" smtClean="0"/>
+              <a:t>Log out</a:t>
+            </a:r>
+          </a:p>
+          <a:p>
+            <a:pPr marL="228600" indent="-228600">
+              <a:buAutoNum type="arabicPeriod" startAt="6"/>
+            </a:pPr>
+            <a:r>
+              <a:rPr lang="en-US" baseline="0" dirty="0" smtClean="0"/>
+              <a:t>Login </a:t>
+            </a:r>
+            <a:r>
+              <a:rPr lang="en-US" baseline="0" dirty="0" err="1" smtClean="0"/>
+              <a:t>jonas</a:t>
+            </a:r>
+            <a:endParaRPr lang="en-US" baseline="0" dirty="0" smtClean="0"/>
+          </a:p>
+          <a:p>
+            <a:pPr marL="228600" indent="-228600">
+              <a:buAutoNum type="arabicPeriod" startAt="6"/>
+            </a:pPr>
+            <a:r>
+              <a:rPr lang="en-US" baseline="0" dirty="0" smtClean="0"/>
+              <a:t>Display </a:t>
+            </a:r>
+            <a:r>
+              <a:rPr lang="en-US" baseline="0" dirty="0" err="1" smtClean="0"/>
+              <a:t>Duells</a:t>
+            </a:r>
+            <a:endParaRPr lang="en-US" baseline="0" dirty="0" smtClean="0"/>
+          </a:p>
+          <a:p>
+            <a:pPr marL="228600" indent="-228600">
+              <a:buAutoNum type="arabicPeriod" startAt="6"/>
+            </a:pPr>
+            <a:r>
+              <a:rPr lang="en-US" baseline="0" dirty="0" smtClean="0"/>
+              <a:t>New </a:t>
+            </a:r>
+            <a:r>
+              <a:rPr lang="en-US" baseline="0" dirty="0" err="1" smtClean="0"/>
+              <a:t>duell</a:t>
+            </a:r>
+            <a:r>
+              <a:rPr lang="en-US" baseline="0" dirty="0" smtClean="0"/>
+              <a:t> </a:t>
+            </a:r>
+            <a:r>
+              <a:rPr lang="en-US" baseline="0" dirty="0" err="1" smtClean="0"/>
+              <a:t>james</a:t>
+            </a:r>
+            <a:endParaRPr lang="en-US" baseline="0" dirty="0" smtClean="0"/>
+          </a:p>
+          <a:p>
+            <a:pPr marL="0" indent="0">
+              <a:buNone/>
+            </a:pPr>
+            <a:r>
+              <a:rPr lang="en-US" baseline="0" dirty="0" smtClean="0"/>
+              <a:t>10. Display </a:t>
+            </a:r>
+            <a:r>
+              <a:rPr lang="en-US" baseline="0" dirty="0" err="1" smtClean="0"/>
+              <a:t>duells</a:t>
+            </a:r>
+            <a:endParaRPr lang="en-US" baseline="0" dirty="0" smtClean="0"/>
+          </a:p>
+          <a:p>
+            <a:pPr marL="0" marR="0" indent="0" algn="l" defTabSz="914400" rtl="0" eaLnBrk="1" fontAlgn="auto" latinLnBrk="0" hangingPunct="1">
+              <a:lnSpc>
+                <a:spcPct val="100000"/>
+              </a:lnSpc>
+              <a:spcBef>
+                <a:spcPts val="0"/>
+              </a:spcBef>
+              <a:spcAft>
+                <a:spcPts val="0"/>
+              </a:spcAft>
+              <a:buClrTx/>
+              <a:buSzTx/>
+              <a:buFontTx/>
+              <a:buNone/>
+              <a:tabLst/>
+              <a:defRPr/>
+            </a:pPr>
+            <a:r>
+              <a:rPr lang="en-US" baseline="0" dirty="0" smtClean="0"/>
+              <a:t>12. continue </a:t>
+            </a:r>
+            <a:r>
+              <a:rPr lang="en-US" baseline="0" dirty="0" err="1" smtClean="0"/>
+              <a:t>duell</a:t>
+            </a:r>
+            <a:r>
+              <a:rPr lang="en-US" baseline="0" dirty="0" smtClean="0"/>
+              <a:t> </a:t>
+            </a:r>
+            <a:r>
+              <a:rPr lang="en-US" baseline="0" dirty="0" err="1" smtClean="0"/>
+              <a:t>wählen</a:t>
+            </a:r>
+            <a:r>
+              <a:rPr lang="en-US" baseline="0" dirty="0" smtClean="0"/>
+              <a:t> </a:t>
+            </a:r>
+            <a:r>
+              <a:rPr lang="en-US" baseline="0" dirty="0" err="1" smtClean="0"/>
+              <a:t>falsch</a:t>
+            </a:r>
+            <a:endParaRPr lang="en-US" baseline="0" dirty="0" smtClean="0"/>
+          </a:p>
+          <a:p>
+            <a:pPr marL="0" indent="0">
+              <a:buNone/>
+            </a:pPr>
+            <a:r>
+              <a:rPr lang="en-US" baseline="0" dirty="0" smtClean="0"/>
+              <a:t>11. continue </a:t>
+            </a:r>
+            <a:r>
+              <a:rPr lang="en-US" baseline="0" dirty="0" err="1" smtClean="0"/>
+              <a:t>duell</a:t>
+            </a:r>
+            <a:r>
+              <a:rPr lang="en-US" baseline="0" dirty="0" smtClean="0"/>
+              <a:t> </a:t>
+            </a:r>
+            <a:r>
+              <a:rPr lang="en-US" baseline="0" dirty="0" err="1" smtClean="0"/>
+              <a:t>wählen</a:t>
+            </a:r>
+            <a:r>
+              <a:rPr lang="en-US" baseline="0" dirty="0" smtClean="0"/>
+              <a:t> </a:t>
+            </a:r>
+            <a:r>
+              <a:rPr lang="en-US" baseline="0" dirty="0" err="1" smtClean="0"/>
+              <a:t>richtig</a:t>
+            </a:r>
+            <a:endParaRPr lang="en-US" baseline="0" dirty="0" smtClean="0"/>
+          </a:p>
+          <a:p>
+            <a:pPr marL="0" indent="0">
+              <a:buNone/>
+            </a:pPr>
+            <a:endParaRPr lang="en-US" baseline="0" dirty="0" smtClean="0"/>
+          </a:p>
+        </p:txBody>
+      </p:sp>
+      <p:sp>
+        <p:nvSpPr>
+          <p:cNvPr id="4" name="Foliennummernplatzhalter 3"/>
+          <p:cNvSpPr>
+            <a:spLocks noGrp="1"/>
+          </p:cNvSpPr>
+          <p:nvPr>
+            <p:ph type="sldNum" sz="quarter" idx="10"/>
+          </p:nvPr>
+        </p:nvSpPr>
+        <p:spPr/>
+        <p:txBody>
+          <a:bodyPr/>
+          <a:lstStyle/>
+          <a:p>
+            <a:fld id="{54383754-864D-4F90-9E18-125F2028B201}" type="slidenum">
+              <a:rPr lang="de-CH" smtClean="0"/>
+              <a:t>11</a:t>
+            </a:fld>
+            <a:endParaRPr lang="de-CH"/>
+          </a:p>
+        </p:txBody>
+      </p:sp>
+    </p:spTree>
+    <p:extLst>
+      <p:ext uri="{BB962C8B-B14F-4D97-AF65-F5344CB8AC3E}">
+        <p14:creationId xmlns:p14="http://schemas.microsoft.com/office/powerpoint/2010/main" val="845200478"/>
+      </p:ext>
+    </p:extLst>
+  </p:cSld>
+  <p:clrMapOvr>
+    <a:masterClrMapping/>
+  </p:clrMapOvr>
+</p:notes>
+</file>
+
 <file path=ppt/notesSlides/notesSlide2.xml><?xml version="1.0" encoding="utf-8"?>
 <p:notes xmlns:a="http://schemas.openxmlformats.org/drawingml/2006/main" xmlns:r="http://schemas.openxmlformats.org/officeDocument/2006/relationships" xmlns:p="http://schemas.openxmlformats.org/presentationml/2006/main">
   <p:cSld>
@@ -692,7 +999,7 @@
           <a:p>
             <a:r>
               <a:rPr lang="en-US" dirty="0" err="1" smtClean="0"/>
-              <a:t>Loosli</a:t>
+              <a:t>hofer</a:t>
             </a:r>
             <a:endParaRPr lang="de-CH" dirty="0"/>
           </a:p>
@@ -956,7 +1263,37 @@
           <a:p>
             <a:r>
               <a:rPr lang="en-US" dirty="0" err="1" smtClean="0"/>
-              <a:t>schüpbach</a:t>
+              <a:t>Loosli</a:t>
+            </a:r>
+            <a:endParaRPr lang="en-US" dirty="0" smtClean="0"/>
+          </a:p>
+          <a:p>
+            <a:endParaRPr lang="en-US" dirty="0" smtClean="0"/>
+          </a:p>
+          <a:p>
+            <a:r>
+              <a:rPr lang="en-US" dirty="0" err="1" smtClean="0"/>
+              <a:t>Ablauf</a:t>
+            </a:r>
+            <a:r>
+              <a:rPr lang="en-US" baseline="0" dirty="0" smtClean="0"/>
+              <a:t> </a:t>
+            </a:r>
+            <a:r>
+              <a:rPr lang="en-US" baseline="0" dirty="0" err="1" smtClean="0"/>
+              <a:t>ist</a:t>
+            </a:r>
+            <a:r>
+              <a:rPr lang="en-US" baseline="0" dirty="0" smtClean="0"/>
+              <a:t> </a:t>
+            </a:r>
+            <a:r>
+              <a:rPr lang="en-US" baseline="0" dirty="0" err="1" smtClean="0"/>
+              <a:t>Eventbasiert</a:t>
+            </a:r>
+            <a:r>
+              <a:rPr lang="en-US" baseline="0" dirty="0" smtClean="0"/>
+              <a:t>.</a:t>
             </a:r>
             <a:endParaRPr lang="de-CH" dirty="0"/>
           </a:p>
@@ -979,7 +1316,7 @@
           <a:p>
             <a:fld id="{54383754-864D-4F90-9E18-125F2028B201}" type="slidenum">
               <a:rPr lang="de-CH" smtClean="0"/>
-              <a:t>7</a:t>
+              <a:t>6</a:t>
             </a:fld>
             <a:endParaRPr lang="de-CH"/>
           </a:p>
@@ -988,7 +1325,7 @@
     </p:spTree>
     <p:extLst>
       <p:ext uri="{BB962C8B-B14F-4D97-AF65-F5344CB8AC3E}">
-        <p14:creationId xmlns:p14="http://schemas.microsoft.com/office/powerpoint/2010/main" val="1270284495"/>
+        <p14:creationId xmlns:p14="http://schemas.microsoft.com/office/powerpoint/2010/main" val="701025002"/>
       </p:ext>
     </p:extLst>
   </p:cSld>
@@ -1044,98 +1381,8 @@
           <a:p>
             <a:r>
               <a:rPr lang="en-US" dirty="0" err="1" smtClean="0"/>
-              <a:t>loosli</a:t>
-            </a:r>
-            <a:endParaRPr lang="en-US" dirty="0" smtClean="0"/>
-          </a:p>
-          <a:p>
-            <a:endParaRPr lang="en-US" dirty="0" smtClean="0"/>
-          </a:p>
-          <a:p>
-            <a:r>
-              <a:rPr lang="en-US" dirty="0" smtClean="0"/>
-              <a:t>State Event: </a:t>
-            </a:r>
-            <a:r>
-              <a:rPr lang="en-US" dirty="0" err="1" smtClean="0"/>
-              <a:t>z.B</a:t>
-            </a:r>
-            <a:r>
-              <a:rPr lang="en-US" dirty="0" smtClean="0"/>
-              <a:t>. LOGGED_IN</a:t>
-            </a:r>
-            <a:r>
-              <a:rPr lang="en-US" baseline="0" dirty="0" smtClean="0"/>
-              <a:t>;  IN_GAME;LOGGED_OUT</a:t>
-            </a:r>
-          </a:p>
-          <a:p>
-            <a:r>
-              <a:rPr lang="en-US" baseline="0" dirty="0" err="1" smtClean="0"/>
-              <a:t>KeyMap</a:t>
-            </a:r>
-            <a:r>
-              <a:rPr lang="en-US" baseline="0" dirty="0" smtClean="0"/>
-              <a:t>: </a:t>
-            </a:r>
-            <a:r>
-              <a:rPr lang="en-US" baseline="0" dirty="0" err="1" smtClean="0"/>
-              <a:t>Buchstaben</a:t>
-            </a:r>
-            <a:r>
-              <a:rPr lang="en-US" baseline="0" dirty="0" smtClean="0"/>
-              <a:t> in </a:t>
-            </a:r>
-            <a:r>
-              <a:rPr lang="en-US" baseline="0" dirty="0" err="1" smtClean="0"/>
-              <a:t>Zahlen</a:t>
-            </a:r>
-            <a:r>
-              <a:rPr lang="en-US" baseline="0" dirty="0" smtClean="0"/>
-              <a:t> </a:t>
-            </a:r>
-            <a:r>
-              <a:rPr lang="en-US" baseline="0" dirty="0" err="1" smtClean="0"/>
-              <a:t>umwandelbar</a:t>
-            </a:r>
-            <a:r>
-              <a:rPr lang="en-US" baseline="0" dirty="0" smtClean="0"/>
-              <a:t>. (intern </a:t>
-            </a:r>
-            <a:r>
-              <a:rPr lang="en-US" baseline="0" dirty="0" err="1" smtClean="0"/>
-              <a:t>wird</a:t>
-            </a:r>
-            <a:r>
-              <a:rPr lang="en-US" baseline="0" dirty="0" smtClean="0"/>
-              <a:t> </a:t>
-            </a:r>
-            <a:r>
-              <a:rPr lang="en-US" baseline="0" dirty="0" err="1" smtClean="0"/>
-              <a:t>mit</a:t>
-            </a:r>
-            <a:r>
-              <a:rPr lang="en-US" baseline="0" dirty="0" smtClean="0"/>
-              <a:t> </a:t>
-            </a:r>
-            <a:r>
-              <a:rPr lang="en-US" baseline="0" dirty="0" err="1" smtClean="0"/>
-              <a:t>Zahlen</a:t>
-            </a:r>
-            <a:r>
-              <a:rPr lang="en-US" baseline="0" dirty="0" smtClean="0"/>
-              <a:t> </a:t>
-            </a:r>
-            <a:r>
-              <a:rPr lang="en-US" baseline="0" dirty="0" err="1" smtClean="0"/>
-              <a:t>gerechnet</a:t>
-            </a:r>
-            <a:r>
-              <a:rPr lang="en-US" baseline="0" dirty="0" smtClean="0"/>
-              <a:t>)</a:t>
-            </a:r>
-          </a:p>
-          <a:p>
+              <a:t>schüpbach</a:t>
+            </a:r>
             <a:endParaRPr lang="de-CH" dirty="0"/>
           </a:p>
         </p:txBody>
@@ -1166,7 +1413,7 @@
     </p:spTree>
     <p:extLst>
       <p:ext uri="{BB962C8B-B14F-4D97-AF65-F5344CB8AC3E}">
-        <p14:creationId xmlns:p14="http://schemas.microsoft.com/office/powerpoint/2010/main" val="226605329"/>
+        <p14:creationId xmlns:p14="http://schemas.microsoft.com/office/powerpoint/2010/main" val="1270284495"/>
       </p:ext>
     </p:extLst>
   </p:cSld>
@@ -1222,8 +1469,127 @@
           <a:p>
             <a:r>
               <a:rPr lang="en-US" dirty="0" err="1" smtClean="0"/>
-              <a:t>hofer</a:t>
-            </a:r>
+              <a:t>loosli</a:t>
+            </a:r>
+            <a:endParaRPr lang="en-US" dirty="0" smtClean="0"/>
+          </a:p>
+          <a:p>
+            <a:endParaRPr lang="en-US" dirty="0" smtClean="0"/>
+          </a:p>
+          <a:p>
+            <a:r>
+              <a:rPr lang="en-US" dirty="0" smtClean="0"/>
+              <a:t>State Event: </a:t>
+            </a:r>
+            <a:r>
+              <a:rPr lang="en-US" dirty="0" err="1" smtClean="0"/>
+              <a:t>z.B</a:t>
+            </a:r>
+            <a:r>
+              <a:rPr lang="en-US" dirty="0" smtClean="0"/>
+              <a:t>. LOGGED_IN</a:t>
+            </a:r>
+            <a:r>
+              <a:rPr lang="en-US" baseline="0" dirty="0" smtClean="0"/>
+              <a:t>;  </a:t>
+            </a:r>
+            <a:r>
+              <a:rPr lang="en-US" baseline="0" dirty="0" smtClean="0"/>
+              <a:t>IN_GAME;LOGGED_OUT (</a:t>
+            </a:r>
+            <a:r>
+              <a:rPr lang="en-US" baseline="0" dirty="0" err="1" smtClean="0"/>
+              <a:t>siehe</a:t>
+            </a:r>
+            <a:r>
+              <a:rPr lang="en-US" baseline="0" dirty="0" smtClean="0"/>
+              <a:t> </a:t>
+            </a:r>
+            <a:r>
+              <a:rPr lang="en-US" baseline="0" dirty="0" err="1" smtClean="0"/>
+              <a:t>nächste</a:t>
+            </a:r>
+            <a:r>
+              <a:rPr lang="en-US" baseline="0" dirty="0" smtClean="0"/>
+              <a:t> </a:t>
+            </a:r>
+            <a:r>
+              <a:rPr lang="en-US" baseline="0" dirty="0" err="1" smtClean="0"/>
+              <a:t>folie</a:t>
+            </a:r>
+            <a:r>
+              <a:rPr lang="en-US" baseline="0" smtClean="0"/>
+              <a:t>)</a:t>
+            </a:r>
+            <a:endParaRPr lang="en-US" baseline="0" dirty="0" smtClean="0"/>
+          </a:p>
+          <a:p>
+            <a:r>
+              <a:rPr lang="en-US" baseline="0" dirty="0" err="1" smtClean="0"/>
+              <a:t>KeyMap</a:t>
+            </a:r>
+            <a:r>
+              <a:rPr lang="en-US" baseline="0" dirty="0" smtClean="0"/>
+              <a:t>: </a:t>
+            </a:r>
+            <a:r>
+              <a:rPr lang="en-US" baseline="0" dirty="0" err="1" smtClean="0"/>
+              <a:t>Buchstaben</a:t>
+            </a:r>
+            <a:r>
+              <a:rPr lang="en-US" baseline="0" dirty="0" smtClean="0"/>
+              <a:t> in </a:t>
+            </a:r>
+            <a:r>
+              <a:rPr lang="en-US" baseline="0" dirty="0" err="1" smtClean="0"/>
+              <a:t>Zahlen</a:t>
+            </a:r>
+            <a:r>
+              <a:rPr lang="en-US" baseline="0" dirty="0" smtClean="0"/>
+              <a:t> </a:t>
+            </a:r>
+            <a:r>
+              <a:rPr lang="en-US" baseline="0" dirty="0" err="1" smtClean="0"/>
+              <a:t>umwandelbar</a:t>
+            </a:r>
+            <a:r>
+              <a:rPr lang="en-US" baseline="0" dirty="0" smtClean="0"/>
+              <a:t>. (intern </a:t>
+            </a:r>
+            <a:r>
+              <a:rPr lang="en-US" baseline="0" dirty="0" err="1" smtClean="0"/>
+              <a:t>wird</a:t>
+            </a:r>
+            <a:r>
+              <a:rPr lang="en-US" baseline="0" dirty="0" smtClean="0"/>
+              <a:t> </a:t>
+            </a:r>
+            <a:r>
+              <a:rPr lang="en-US" baseline="0" dirty="0" err="1" smtClean="0"/>
+              <a:t>mit</a:t>
+            </a:r>
+            <a:r>
+              <a:rPr lang="en-US" baseline="0" dirty="0" smtClean="0"/>
+              <a:t> </a:t>
+            </a:r>
+            <a:r>
+              <a:rPr lang="en-US" baseline="0" dirty="0" err="1" smtClean="0"/>
+              <a:t>Zahlen</a:t>
+            </a:r>
+            <a:r>
+              <a:rPr lang="en-US" baseline="0" dirty="0" smtClean="0"/>
+              <a:t> </a:t>
+            </a:r>
+            <a:r>
+              <a:rPr lang="en-US" baseline="0" dirty="0" err="1" smtClean="0"/>
+              <a:t>gerechnet</a:t>
+            </a:r>
+            <a:r>
+              <a:rPr lang="en-US" baseline="0" dirty="0" smtClean="0"/>
+              <a:t>)</a:t>
+            </a:r>
+          </a:p>
+          <a:p>
             <a:endParaRPr lang="de-CH" dirty="0"/>
           </a:p>
         </p:txBody>
@@ -1254,7 +1620,7 @@
     </p:spTree>
     <p:extLst>
       <p:ext uri="{BB962C8B-B14F-4D97-AF65-F5344CB8AC3E}">
-        <p14:creationId xmlns:p14="http://schemas.microsoft.com/office/powerpoint/2010/main" val="3361615121"/>
+        <p14:creationId xmlns:p14="http://schemas.microsoft.com/office/powerpoint/2010/main" val="226605329"/>
       </p:ext>
     </p:extLst>
   </p:cSld>
@@ -1308,12 +1674,9 @@
           <a:bodyPr/>
           <a:lstStyle/>
           <a:p>
-            <a:pPr marL="228600" indent="-228600">
-              <a:buAutoNum type="arabicPeriod"/>
-            </a:pPr>
-            <a:r>
-              <a:rPr lang="en-US" dirty="0" smtClean="0"/>
-              <a:t>Login</a:t>
+            <a:r>
+              <a:rPr lang="en-US" dirty="0" err="1" smtClean="0"/>
+              <a:t>Datenpool</a:t>
             </a:r>
             <a:r>
               <a:rPr lang="en-US" baseline="0" dirty="0" smtClean="0"/>
@@ -1321,112 +1684,57 @@
             </a:r>
             <a:r>
               <a:rPr lang="en-US" baseline="0" dirty="0" err="1" smtClean="0"/>
-              <a:t>überprüfen</a:t>
-            </a:r>
-            <a:endParaRPr lang="en-US" baseline="0" dirty="0" smtClean="0"/>
-          </a:p>
-          <a:p>
-            <a:pPr marL="228600" indent="-228600">
-              <a:buAutoNum type="arabicPeriod"/>
-            </a:pPr>
+              <a:t>austauschbar</a:t>
+            </a:r>
             <a:r>
               <a:rPr lang="en-US" baseline="0" dirty="0" smtClean="0"/>
-              <a:t>2. Login </a:t>
+              <a:t>: </a:t>
             </a:r>
             <a:r>
               <a:rPr lang="en-US" baseline="0" dirty="0" err="1" smtClean="0"/>
-              <a:t>mit</a:t>
+              <a:t>z.B</a:t>
             </a:r>
             <a:r>
               <a:rPr lang="en-US" baseline="0" dirty="0" smtClean="0"/>
-              <a:t> James</a:t>
-            </a:r>
-          </a:p>
-          <a:p>
-            <a:pPr marL="228600" indent="-228600">
-              <a:buAutoNum type="arabicPeriod"/>
-            </a:pPr>
+              <a:t>. MySQL </a:t>
+            </a:r>
+            <a:r>
+              <a:rPr lang="en-US" baseline="0" dirty="0" err="1" smtClean="0"/>
+              <a:t>Datenbank</a:t>
+            </a:r>
             <a:r>
               <a:rPr lang="en-US" baseline="0" dirty="0" smtClean="0"/>
-              <a:t>Continue</a:t>
-            </a:r>
-          </a:p>
-          <a:p>
-            <a:pPr marL="228600" indent="-228600">
-              <a:buAutoNum type="arabicPeriod"/>
-            </a:pPr>
+              <a:t>; </a:t>
+            </a:r>
+            <a:r>
+              <a:rPr lang="en-US" baseline="0" dirty="0" err="1" smtClean="0"/>
+              <a:t>Externer</a:t>
+            </a:r>
             <a:r>
               <a:rPr lang="en-US" baseline="0" dirty="0" smtClean="0"/>
-              <a:t>Display </a:t>
-            </a:r>
+              <a:t> Server; XML File</a:t>
+            </a:r>
+          </a:p>
+          <a:p>
             <a:r>
               <a:rPr lang="en-US" baseline="0" dirty="0" err="1" smtClean="0"/>
-              <a:t>duells</a:t>
-            </a:r>
-            <a:endParaRPr lang="en-US" baseline="0" dirty="0" smtClean="0"/>
-          </a:p>
-          <a:p>
-            <a:pPr marL="228600" indent="-228600">
-              <a:buAutoNum type="arabicPeriod"/>
-            </a:pPr>
+              <a:t>Wie</a:t>
+            </a:r>
             <a:r>
               <a:rPr lang="en-US" baseline="0" dirty="0" smtClean="0"/>
-              <a:t>New </a:t>
+              <a:t> Original  </a:t>
             </a:r>
             <a:r>
               <a:rPr lang="en-US" baseline="0" dirty="0" err="1" smtClean="0"/>
-              <a:t>duells</a:t>
-            </a:r>
-            <a:endParaRPr lang="en-US" baseline="0" dirty="0" smtClean="0"/>
-          </a:p>
-          <a:p>
-            <a:pPr marL="228600" indent="-228600">
-              <a:buAutoNum type="arabicPeriod" startAt="6"/>
-            </a:pPr>
+              <a:t>Quizduell</a:t>
+            </a:r>
             <a:r>
               <a:rPr lang="en-US" baseline="0" dirty="0" smtClean="0"/>
-              <a:t>Log out</a:t>
-            </a:r>
-          </a:p>
-          <a:p>
-            <a:pPr marL="228600" indent="-228600">
-              <a:buAutoNum type="arabicPeriod" startAt="6"/>
-            </a:pPr>
-            <a:r>
-              <a:rPr lang="en-US" baseline="0" dirty="0" smtClean="0"/>
-              <a:t>Login </a:t>
+              <a:t> via Android App, </a:t>
             </a:r>
             <a:r>
               <a:rPr lang="en-US" baseline="0" dirty="0" err="1" smtClean="0"/>
-              <a:t>jonas</a:t>
-            </a:r>
-            <a:endParaRPr lang="en-US" baseline="0" dirty="0" smtClean="0"/>
-          </a:p>
-          <a:p>
-            <a:pPr marL="228600" indent="-228600">
-              <a:buAutoNum type="arabicPeriod" startAt="6"/>
-            </a:pPr>
-            <a:r>
-              <a:rPr lang="en-US" baseline="0" dirty="0" smtClean="0"/>
-              <a:t>Display </a:t>
-            </a:r>
-            <a:r>
-              <a:rPr lang="en-US" baseline="0" dirty="0" err="1" smtClean="0"/>
-              <a:t>Duells</a:t>
-            </a:r>
-            <a:endParaRPr lang="en-US" baseline="0" dirty="0" smtClean="0"/>
-          </a:p>
-          <a:p>
-            <a:pPr marL="228600" indent="-228600">
-              <a:buAutoNum type="arabicPeriod" startAt="6"/>
-            </a:pPr>
-            <a:r>
-              <a:rPr lang="en-US" baseline="0" dirty="0" smtClean="0"/>
-              <a:t>New </a:t>
-            </a:r>
-            <a:r>
-              <a:rPr lang="en-US" baseline="0" dirty="0" err="1" smtClean="0"/>
-              <a:t>duell</a:t>
+              <a:t>Daten</a:t>
             </a:r>
             <a:r>
               <a:rPr lang="en-US" baseline="0" dirty="0" smtClean="0"/>
@@ -1434,49 +1742,7 @@
             </a:r>
             <a:r>
               <a:rPr lang="en-US" baseline="0" dirty="0" err="1" smtClean="0"/>
-              <a:t>james</a:t>
-            </a:r>
-            <a:endParaRPr lang="en-US" baseline="0" dirty="0" smtClean="0"/>
-          </a:p>
-          <a:p>
-            <a:pPr marL="0" indent="0">
-              <a:buNone/>
-            </a:pPr>
-            <a:r>
-              <a:rPr lang="en-US" baseline="0" dirty="0" smtClean="0"/>
-              <a:t>10. Display </a:t>
-            </a:r>
-            <a:r>
-              <a:rPr lang="en-US" baseline="0" dirty="0" err="1" smtClean="0"/>
-              <a:t>duells</a:t>
-            </a:r>
-            <a:endParaRPr lang="en-US" baseline="0" dirty="0" smtClean="0"/>
-          </a:p>
-          <a:p>
-            <a:pPr marL="0" marR="0" indent="0" algn="l" defTabSz="914400" rtl="0" eaLnBrk="1" fontAlgn="auto" latinLnBrk="0" hangingPunct="1">
-              <a:lnSpc>
-                <a:spcPct val="100000"/>
-              </a:lnSpc>
-              <a:spcBef>
-                <a:spcPts val="0"/>
-              </a:spcBef>
-              <a:spcAft>
-                <a:spcPts val="0"/>
-              </a:spcAft>
-              <a:buClrTx/>
-              <a:buSzTx/>
-              <a:buFontTx/>
-              <a:buNone/>
-              <a:tabLst/>
-              <a:defRPr/>
-            </a:pPr>
-            <a:r>
-              <a:rPr lang="en-US" baseline="0" dirty="0" smtClean="0"/>
-              <a:t>12. continue </a:t>
-            </a:r>
-            <a:r>
-              <a:rPr lang="en-US" baseline="0" dirty="0" err="1" smtClean="0"/>
-              <a:t>duell</a:t>
+              <a:t>werden</a:t>
             </a:r>
             <a:r>
               <a:rPr lang="en-US" baseline="0" dirty="0" smtClean="0"/>
@@ -1484,7 +1750,7 @@
             </a:r>
             <a:r>
               <a:rPr lang="en-US" baseline="0" dirty="0" err="1" smtClean="0"/>
-              <a:t>wählen</a:t>
+              <a:t>zentranl</a:t>
             </a:r>
             <a:r>
               <a:rPr lang="en-US" baseline="0" dirty="0" smtClean="0"/>
@@ -1492,21 +1758,42 @@
             </a:r>
             <a:r>
               <a:rPr lang="en-US" baseline="0" dirty="0" err="1" smtClean="0"/>
-              <a:t>falsch</a:t>
+              <a:t>gespeichert</a:t>
             </a:r>
             <a:endParaRPr lang="en-US" baseline="0" dirty="0" smtClean="0"/>
           </a:p>
           <a:p>
-            <a:pPr marL="0" indent="0">
-              <a:buNone/>
-            </a:pPr>
             <a:r>
               <a:rPr lang="en-US" baseline="0" dirty="0" smtClean="0"/>
-              <a:t>11. continue </a:t>
+              <a:t>Die </a:t>
             </a:r>
             <a:r>
               <a:rPr lang="en-US" baseline="0" dirty="0" err="1" smtClean="0"/>
-              <a:t>duell</a:t>
+              <a:t>Anzahl</a:t>
+            </a:r>
+            <a:r>
+              <a:rPr lang="en-US" baseline="0" dirty="0" smtClean="0"/>
+              <a:t> der </a:t>
+            </a:r>
+            <a:r>
+              <a:rPr lang="en-US" baseline="0" dirty="0" err="1" smtClean="0"/>
+              <a:t>Fragen</a:t>
+            </a:r>
+            <a:r>
+              <a:rPr lang="en-US" baseline="0" dirty="0" smtClean="0"/>
+              <a:t>, </a:t>
+            </a:r>
+            <a:r>
+              <a:rPr lang="en-US" baseline="0" dirty="0" err="1" smtClean="0"/>
+              <a:t>Runden</a:t>
+            </a:r>
+            <a:r>
+              <a:rPr lang="en-US" baseline="0" dirty="0" smtClean="0"/>
+              <a:t> und </a:t>
+            </a:r>
+            <a:r>
+              <a:rPr lang="en-US" baseline="0" dirty="0" err="1" smtClean="0"/>
+              <a:t>Antworten</a:t>
             </a:r>
             <a:r>
               <a:rPr lang="en-US" baseline="0" dirty="0" smtClean="0"/>
@@ -1514,7 +1801,7 @@
             </a:r>
             <a:r>
               <a:rPr lang="en-US" baseline="0" dirty="0" err="1" smtClean="0"/>
-              <a:t>wählen</a:t>
+              <a:t>können</a:t>
             </a:r>
             <a:r>
               <a:rPr lang="en-US" baseline="0" dirty="0" smtClean="0"/>
@@ -1522,15 +1809,139 @@
             </a:r>
             <a:r>
               <a:rPr lang="en-US" baseline="0" dirty="0" err="1" smtClean="0"/>
-              <a:t>richtig</a:t>
-            </a:r>
-            <a:endParaRPr lang="en-US" baseline="0" dirty="0" smtClean="0"/>
-          </a:p>
-          <a:p>
-            <a:pPr marL="0" indent="0">
-              <a:buNone/>
-            </a:pPr>
-            <a:endParaRPr lang="en-US" baseline="0" dirty="0" smtClean="0"/>
+              <a:t>angepasst</a:t>
+            </a:r>
+            <a:r>
+              <a:rPr lang="en-US" baseline="0" dirty="0" smtClean="0"/>
+              <a:t> </a:t>
+            </a:r>
+            <a:r>
+              <a:rPr lang="en-US" baseline="0" dirty="0" err="1" smtClean="0"/>
+              <a:t>werden</a:t>
+            </a:r>
+            <a:r>
+              <a:rPr lang="en-US" baseline="0" dirty="0" smtClean="0"/>
+              <a:t> ( Da </a:t>
+            </a:r>
+            <a:r>
+              <a:rPr lang="en-US" baseline="0" dirty="0" err="1" smtClean="0"/>
+              <a:t>diese</a:t>
+            </a:r>
+            <a:r>
+              <a:rPr lang="en-US" baseline="0" dirty="0" smtClean="0"/>
+              <a:t> </a:t>
+            </a:r>
+            <a:r>
+              <a:rPr lang="en-US" baseline="0" dirty="0" err="1" smtClean="0"/>
+              <a:t>als</a:t>
+            </a:r>
+            <a:r>
+              <a:rPr lang="en-US" baseline="0" dirty="0" smtClean="0"/>
+              <a:t> </a:t>
+            </a:r>
+            <a:r>
+              <a:rPr lang="en-US" baseline="0" dirty="0" err="1" smtClean="0"/>
+              <a:t>ArrayList</a:t>
+            </a:r>
+            <a:r>
+              <a:rPr lang="en-US" baseline="0" dirty="0" smtClean="0"/>
+              <a:t> </a:t>
+            </a:r>
+            <a:r>
+              <a:rPr lang="en-US" baseline="0" dirty="0" err="1" smtClean="0"/>
+              <a:t>gespeichert</a:t>
+            </a:r>
+            <a:r>
+              <a:rPr lang="en-US" baseline="0" dirty="0" smtClean="0"/>
+              <a:t> </a:t>
+            </a:r>
+            <a:r>
+              <a:rPr lang="en-US" baseline="0" dirty="0" err="1" smtClean="0"/>
+              <a:t>werden</a:t>
+            </a:r>
+            <a:r>
+              <a:rPr lang="en-US" baseline="0" dirty="0" smtClean="0"/>
+              <a:t> )</a:t>
+            </a:r>
+          </a:p>
+          <a:p>
+            <a:endParaRPr lang="en-US" dirty="0" smtClean="0"/>
+          </a:p>
+          <a:p>
+            <a:r>
+              <a:rPr lang="en-US" dirty="0" err="1" smtClean="0"/>
+              <a:t>Nachteile</a:t>
+            </a:r>
+            <a:r>
+              <a:rPr lang="en-US" dirty="0" smtClean="0"/>
+              <a:t>: </a:t>
+            </a:r>
+          </a:p>
+          <a:p>
+            <a:r>
+              <a:rPr lang="en-US" dirty="0" err="1" smtClean="0"/>
+              <a:t>QuizServer</a:t>
+            </a:r>
+            <a:r>
+              <a:rPr lang="en-US" baseline="0" dirty="0" smtClean="0"/>
+              <a:t> </a:t>
+            </a:r>
+            <a:r>
+              <a:rPr lang="en-US" baseline="0" dirty="0" err="1" smtClean="0"/>
+              <a:t>Klassen</a:t>
+            </a:r>
+            <a:r>
+              <a:rPr lang="en-US" baseline="0" dirty="0" smtClean="0"/>
+              <a:t>: In helper </a:t>
+            </a:r>
+            <a:r>
+              <a:rPr lang="en-US" baseline="0" dirty="0" err="1" smtClean="0"/>
+              <a:t>klassen</a:t>
+            </a:r>
+            <a:r>
+              <a:rPr lang="en-US" baseline="0" dirty="0" smtClean="0"/>
+              <a:t> </a:t>
+            </a:r>
+            <a:r>
+              <a:rPr lang="en-US" baseline="0" dirty="0" err="1" smtClean="0"/>
+              <a:t>auslagern</a:t>
+            </a:r>
+            <a:r>
+              <a:rPr lang="en-US" baseline="0" dirty="0" smtClean="0"/>
+              <a:t>; in </a:t>
+            </a:r>
+            <a:r>
+              <a:rPr lang="en-US" baseline="0" dirty="0" err="1" smtClean="0"/>
+              <a:t>mehrere</a:t>
+            </a:r>
+            <a:r>
+              <a:rPr lang="en-US" baseline="0" dirty="0" smtClean="0"/>
+              <a:t> </a:t>
+            </a:r>
+            <a:r>
+              <a:rPr lang="en-US" baseline="0" dirty="0" err="1" smtClean="0"/>
+              <a:t>Klassen</a:t>
+            </a:r>
+            <a:r>
+              <a:rPr lang="en-US" baseline="0" dirty="0" smtClean="0"/>
+              <a:t> </a:t>
+            </a:r>
+            <a:r>
+              <a:rPr lang="en-US" baseline="0" dirty="0" err="1" smtClean="0"/>
+              <a:t>aufteilen</a:t>
+            </a:r>
+            <a:r>
+              <a:rPr lang="en-US" baseline="0" dirty="0" smtClean="0"/>
+              <a:t>.</a:t>
+            </a:r>
+            <a:endParaRPr lang="en-US" dirty="0" smtClean="0"/>
+          </a:p>
+          <a:p>
+            <a:r>
+              <a:rPr lang="en-US" dirty="0" err="1" smtClean="0"/>
+              <a:t>hofer</a:t>
+            </a:r>
+            <a:endParaRPr lang="de-CH" dirty="0"/>
           </a:p>
         </p:txBody>
       </p:sp>
@@ -1560,7 +1971,7 @@
     </p:spTree>
     <p:extLst>
       <p:ext uri="{BB962C8B-B14F-4D97-AF65-F5344CB8AC3E}">
-        <p14:creationId xmlns:p14="http://schemas.microsoft.com/office/powerpoint/2010/main" val="845200478"/>
+        <p14:creationId xmlns:p14="http://schemas.microsoft.com/office/powerpoint/2010/main" val="3361615121"/>
       </p:ext>
     </p:extLst>
   </p:cSld>
@@ -4675,6 +5086,232 @@
           <a:lstStyle/>
           <a:p>
             <a:r>
+              <a:rPr lang="en-US" dirty="0" err="1" smtClean="0"/>
+              <a:t>Vor</a:t>
+            </a:r>
+            <a:r>
+              <a:rPr lang="en-US" dirty="0" smtClean="0"/>
+              <a:t>- und </a:t>
+            </a:r>
+            <a:r>
+              <a:rPr lang="en-US" dirty="0" err="1" smtClean="0"/>
+              <a:t>Nachteile</a:t>
+            </a:r>
+            <a:r>
+              <a:rPr lang="en-US" dirty="0" smtClean="0"/>
+              <a:t> </a:t>
+            </a:r>
+            <a:r>
+              <a:rPr lang="en-US" dirty="0" err="1" smtClean="0"/>
+              <a:t>unserer</a:t>
+            </a:r>
+            <a:r>
+              <a:rPr lang="en-US" dirty="0" smtClean="0"/>
+              <a:t> </a:t>
+            </a:r>
+            <a:r>
+              <a:rPr lang="en-US" dirty="0" err="1" smtClean="0"/>
+              <a:t>Lösung</a:t>
+            </a:r>
+            <a:endParaRPr lang="de-CH" dirty="0"/>
+          </a:p>
+        </p:txBody>
+      </p:sp>
+      <p:sp>
+        <p:nvSpPr>
+          <p:cNvPr id="3" name="Inhaltsplatzhalter 2"/>
+          <p:cNvSpPr>
+            <a:spLocks noGrp="1"/>
+          </p:cNvSpPr>
+          <p:nvPr>
+            <p:ph idx="1"/>
+          </p:nvPr>
+        </p:nvSpPr>
+        <p:spPr/>
+        <p:txBody>
+          <a:bodyPr/>
+          <a:lstStyle/>
+          <a:p>
+            <a:pPr marL="0" indent="0">
+              <a:buNone/>
+            </a:pPr>
+            <a:r>
+              <a:rPr lang="en-US" b="1" dirty="0" err="1" smtClean="0"/>
+              <a:t>Vorteile</a:t>
+            </a:r>
+            <a:endParaRPr lang="de-CH" b="1" dirty="0" smtClean="0"/>
+          </a:p>
+          <a:p>
+            <a:r>
+              <a:rPr lang="en-US" dirty="0" err="1" smtClean="0"/>
+              <a:t>Datenpool</a:t>
+            </a:r>
+            <a:r>
+              <a:rPr lang="en-US" dirty="0" smtClean="0"/>
+              <a:t> </a:t>
+            </a:r>
+            <a:r>
+              <a:rPr lang="en-US" dirty="0" err="1" smtClean="0"/>
+              <a:t>austauschbar</a:t>
+            </a:r>
+            <a:endParaRPr lang="en-US" dirty="0" smtClean="0"/>
+          </a:p>
+          <a:p>
+            <a:r>
+              <a:rPr lang="en-US" dirty="0" err="1" smtClean="0"/>
+              <a:t>Als</a:t>
+            </a:r>
+            <a:r>
+              <a:rPr lang="en-US" dirty="0" smtClean="0"/>
+              <a:t> Client- Server </a:t>
+            </a:r>
+            <a:r>
+              <a:rPr lang="en-US" dirty="0" err="1" smtClean="0"/>
+              <a:t>Applikation</a:t>
+            </a:r>
+            <a:r>
+              <a:rPr lang="en-US" dirty="0" smtClean="0"/>
+              <a:t> </a:t>
+            </a:r>
+            <a:r>
+              <a:rPr lang="en-US" dirty="0" err="1" smtClean="0"/>
+              <a:t>erweiterbar</a:t>
+            </a:r>
+            <a:endParaRPr lang="en-US" dirty="0" smtClean="0"/>
+          </a:p>
+          <a:p>
+            <a:r>
+              <a:rPr lang="en-US" dirty="0" err="1" smtClean="0"/>
+              <a:t>Anpassbar</a:t>
+            </a:r>
+            <a:r>
+              <a:rPr lang="en-US" dirty="0" smtClean="0"/>
+              <a:t> (</a:t>
+            </a:r>
+            <a:r>
+              <a:rPr lang="en-US" dirty="0" err="1" smtClean="0"/>
+              <a:t>Fragen</a:t>
+            </a:r>
+            <a:r>
+              <a:rPr lang="en-US" dirty="0" smtClean="0"/>
+              <a:t>, </a:t>
+            </a:r>
+            <a:r>
+              <a:rPr lang="en-US" dirty="0" err="1" smtClean="0"/>
+              <a:t>Runden</a:t>
+            </a:r>
+            <a:r>
+              <a:rPr lang="en-US" dirty="0" smtClean="0"/>
+              <a:t>, </a:t>
+            </a:r>
+            <a:r>
+              <a:rPr lang="en-US" dirty="0" err="1" smtClean="0"/>
+              <a:t>Antworten</a:t>
+            </a:r>
+            <a:r>
+              <a:rPr lang="en-US" dirty="0" smtClean="0"/>
+              <a:t>)</a:t>
+            </a:r>
+          </a:p>
+          <a:p>
+            <a:pPr marL="0" indent="0">
+              <a:buNone/>
+            </a:pPr>
+            <a:r>
+              <a:rPr lang="en-US" b="1" dirty="0" err="1" smtClean="0"/>
+              <a:t>Nachteile</a:t>
+            </a:r>
+            <a:endParaRPr lang="en-US" b="1" dirty="0" smtClean="0"/>
+          </a:p>
+          <a:p>
+            <a:r>
+              <a:rPr lang="en-US" dirty="0" err="1" smtClean="0"/>
+              <a:t>Geringe</a:t>
+            </a:r>
+            <a:r>
+              <a:rPr lang="en-US" dirty="0" smtClean="0"/>
+              <a:t> </a:t>
+            </a:r>
+            <a:r>
+              <a:rPr lang="en-US" dirty="0" err="1" smtClean="0"/>
+              <a:t>Kohesion</a:t>
+            </a:r>
+            <a:r>
+              <a:rPr lang="en-US" dirty="0" smtClean="0"/>
+              <a:t> von </a:t>
+            </a:r>
+            <a:r>
+              <a:rPr lang="de-DE" dirty="0" err="1" smtClean="0"/>
+              <a:t>QuizServer-Klasse</a:t>
+            </a:r>
+            <a:endParaRPr lang="de-DE" dirty="0" smtClean="0"/>
+          </a:p>
+          <a:p>
+            <a:endParaRPr lang="en-US" dirty="0" smtClean="0"/>
+          </a:p>
+        </p:txBody>
+      </p:sp>
+    </p:spTree>
+    <p:extLst>
+      <p:ext uri="{BB962C8B-B14F-4D97-AF65-F5344CB8AC3E}">
+        <p14:creationId xmlns:p14="http://schemas.microsoft.com/office/powerpoint/2010/main" val="3110578527"/>
+      </p:ext>
+    </p:extLst>
+  </p:cSld>
+  <p:clrMapOvr>
+    <a:masterClrMapping/>
+  </p:clrMapOvr>
+  <mc:AlternateContent xmlns:mc="http://schemas.openxmlformats.org/markup-compatibility/2006" xmlns:p14="http://schemas.microsoft.com/office/powerpoint/2010/main">
+    <mc:Choice Requires="p14">
+      <p:transition spd="slow" p14:dur="2000"/>
+    </mc:Choice>
+    <mc:Fallback xmlns="">
+      <p:transition spd="slow"/>
+    </mc:Fallback>
+  </mc:AlternateContent>
+  <p:timing>
+    <p:tnLst>
+      <p:par>
+        <p:cTn id="1" dur="indefinite" restart="never" nodeType="tmRoot"/>
+      </p:par>
+    </p:tnLst>
+  </p:timing>
+</p:sld>
+</file>
+
+<file path=ppt/slides/slide11.xml><?xml version="1.0" encoding="utf-8"?>
+<p:sld xmlns:a="http://schemas.openxmlformats.org/drawingml/2006/main" xmlns:r="http://schemas.openxmlformats.org/officeDocument/2006/relationships" xmlns:p="http://schemas.openxmlformats.org/presentationml/2006/main">
+  <p:cSld>
+    <p:spTree>
+      <p:nvGrpSpPr>
+        <p:cNvPr id="1" name=""/>
+        <p:cNvGrpSpPr/>
+        <p:nvPr/>
+      </p:nvGrpSpPr>
+      <p:grpSpPr>
+        <a:xfrm>
+          <a:off x="0" y="0"/>
+          <a:ext cx="0" cy="0"/>
+          <a:chOff x="0" y="0"/>
+          <a:chExt cx="0" cy="0"/>
+        </a:xfrm>
+      </p:grpSpPr>
+      <p:sp>
+        <p:nvSpPr>
+          <p:cNvPr id="2" name="Titel 1"/>
+          <p:cNvSpPr>
+            <a:spLocks noGrp="1"/>
+          </p:cNvSpPr>
+          <p:nvPr>
+            <p:ph type="title"/>
+          </p:nvPr>
+        </p:nvSpPr>
+        <p:spPr/>
+        <p:txBody>
+          <a:bodyPr/>
+          <a:lstStyle/>
+          <a:p>
+            <a:r>
               <a:rPr lang="en-US" dirty="0" smtClean="0"/>
               <a:t>Demonstration</a:t>
             </a:r>
@@ -4721,7 +5358,7 @@
 </p:sld>
 </file>
 
-<file path=ppt/slides/slide11.xml><?xml version="1.0" encoding="utf-8"?>
+<file path=ppt/slides/slide12.xml><?xml version="1.0" encoding="utf-8"?>
 <p:sld xmlns:a="http://schemas.openxmlformats.org/drawingml/2006/main" xmlns:r="http://schemas.openxmlformats.org/officeDocument/2006/relationships" xmlns:p="http://schemas.openxmlformats.org/presentationml/2006/main">
   <p:cSld>
     <p:spTree>
@@ -5424,6 +6061,85 @@
           <a:p>
             <a:r>
               <a:rPr lang="en-US" dirty="0" err="1" smtClean="0"/>
+              <a:t>Programmablauf</a:t>
+            </a:r>
+            <a:endParaRPr lang="de-CH" dirty="0"/>
+          </a:p>
+        </p:txBody>
+      </p:sp>
+      <p:sp>
+        <p:nvSpPr>
+          <p:cNvPr id="3" name="Inhaltsplatzhalter 2"/>
+          <p:cNvSpPr>
+            <a:spLocks noGrp="1"/>
+          </p:cNvSpPr>
+          <p:nvPr>
+            <p:ph idx="1"/>
+          </p:nvPr>
+        </p:nvSpPr>
+        <p:spPr/>
+        <p:txBody>
+          <a:bodyPr/>
+          <a:lstStyle/>
+          <a:p>
+            <a:endParaRPr lang="de-CH" dirty="0"/>
+          </a:p>
+        </p:txBody>
+      </p:sp>
+    </p:spTree>
+    <p:extLst>
+      <p:ext uri="{BB962C8B-B14F-4D97-AF65-F5344CB8AC3E}">
+        <p14:creationId xmlns:p14="http://schemas.microsoft.com/office/powerpoint/2010/main" val="603608667"/>
+      </p:ext>
+    </p:extLst>
+  </p:cSld>
+  <p:clrMapOvr>
+    <a:masterClrMapping/>
+  </p:clrMapOvr>
+  <p:timing>
+    <p:tnLst>
+      <p:par>
+        <p:cTn id="1" dur="indefinite" restart="never" nodeType="tmRoot"/>
+      </p:par>
+    </p:tnLst>
+  </p:timing>
+</p:sld>
+</file>
+
+<file path=ppt/slides/slide7.xml><?xml version="1.0" encoding="utf-8"?>
+<p:sld xmlns:a="http://schemas.openxmlformats.org/drawingml/2006/main" xmlns:r="http://schemas.openxmlformats.org/officeDocument/2006/relationships" xmlns:p="http://schemas.openxmlformats.org/presentationml/2006/main">
+  <p:cSld>
+    <p:spTree>
+      <p:nvGrpSpPr>
+        <p:cNvPr id="1" name=""/>
+        <p:cNvGrpSpPr/>
+        <p:nvPr/>
+      </p:nvGrpSpPr>
+      <p:grpSpPr>
+        <a:xfrm>
+          <a:off x="0" y="0"/>
+          <a:ext cx="0" cy="0"/>
+          <a:chOff x="0" y="0"/>
+          <a:chExt cx="0" cy="0"/>
+        </a:xfrm>
+      </p:grpSpPr>
+      <p:sp>
+        <p:nvSpPr>
+          <p:cNvPr id="2" name="Titel 1"/>
+          <p:cNvSpPr>
+            <a:spLocks noGrp="1"/>
+          </p:cNvSpPr>
+          <p:nvPr>
+            <p:ph type="title"/>
+          </p:nvPr>
+        </p:nvSpPr>
+        <p:spPr/>
+        <p:txBody>
+          <a:bodyPr/>
+          <a:lstStyle/>
+          <a:p>
+            <a:r>
+              <a:rPr lang="en-US" dirty="0" err="1" smtClean="0"/>
               <a:t>Unsere</a:t>
             </a:r>
             <a:r>
@@ -5710,7 +6426,7 @@
 </p:sld>
 </file>
 
-<file path=ppt/slides/slide7.xml><?xml version="1.0" encoding="utf-8"?>
+<file path=ppt/slides/slide8.xml><?xml version="1.0" encoding="utf-8"?>
 <p:sld xmlns:a="http://schemas.openxmlformats.org/drawingml/2006/main" xmlns:r="http://schemas.openxmlformats.org/officeDocument/2006/relationships" xmlns:p="http://schemas.openxmlformats.org/presentationml/2006/main">
   <p:cSld>
     <p:spTree>
@@ -5835,207 +6551,6 @@
 </p:sld>
 </file>
 
-<file path=ppt/slides/slide8.xml><?xml version="1.0" encoding="utf-8"?>
-<p:sld xmlns:a="http://schemas.openxmlformats.org/drawingml/2006/main" xmlns:r="http://schemas.openxmlformats.org/officeDocument/2006/relationships" xmlns:p="http://schemas.openxmlformats.org/presentationml/2006/main">
-  <p:cSld>
-    <p:spTree>
-      <p:nvGrpSpPr>
-        <p:cNvPr id="1" name=""/>
-        <p:cNvGrpSpPr/>
-        <p:nvPr/>
-      </p:nvGrpSpPr>
-      <p:grpSpPr>
-        <a:xfrm>
-          <a:off x="0" y="0"/>
-          <a:ext cx="0" cy="0"/>
-          <a:chOff x="0" y="0"/>
-          <a:chExt cx="0" cy="0"/>
-        </a:xfrm>
-      </p:grpSpPr>
-      <p:sp>
-        <p:nvSpPr>
-          <p:cNvPr id="2" name="Titel 1"/>
-          <p:cNvSpPr>
-            <a:spLocks noGrp="1"/>
-          </p:cNvSpPr>
-          <p:nvPr>
-            <p:ph type="title"/>
-          </p:nvPr>
-        </p:nvSpPr>
-        <p:spPr/>
-        <p:txBody>
-          <a:bodyPr/>
-          <a:lstStyle/>
-          <a:p>
-            <a:r>
-              <a:rPr lang="en-US" dirty="0" err="1" smtClean="0"/>
-              <a:t>Unsere</a:t>
-            </a:r>
-            <a:r>
-              <a:rPr lang="en-US" dirty="0" smtClean="0"/>
-              <a:t> </a:t>
-            </a:r>
-            <a:r>
-              <a:rPr lang="en-US" dirty="0" err="1" smtClean="0"/>
-              <a:t>Lösung</a:t>
-            </a:r>
-            <a:r>
-              <a:rPr lang="en-US" dirty="0"/>
-              <a:t> </a:t>
-            </a:r>
-            <a:r>
-              <a:rPr lang="en-US" dirty="0" smtClean="0"/>
-              <a:t>2</a:t>
-            </a:r>
-            <a:endParaRPr lang="de-CH" dirty="0"/>
-          </a:p>
-        </p:txBody>
-      </p:sp>
-      <p:sp>
-        <p:nvSpPr>
-          <p:cNvPr id="3" name="Inhaltsplatzhalter 2"/>
-          <p:cNvSpPr>
-            <a:spLocks noGrp="1"/>
-          </p:cNvSpPr>
-          <p:nvPr>
-            <p:ph idx="1"/>
-          </p:nvPr>
-        </p:nvSpPr>
-        <p:spPr/>
-        <p:txBody>
-          <a:bodyPr/>
-          <a:lstStyle/>
-          <a:p>
-            <a:r>
-              <a:rPr lang="en-US" dirty="0" err="1" smtClean="0"/>
-              <a:t>QuestionPool</a:t>
-            </a:r>
-            <a:r>
-              <a:rPr lang="en-US" dirty="0" smtClean="0"/>
-              <a:t> </a:t>
-            </a:r>
-            <a:r>
-              <a:rPr lang="en-US" dirty="0" err="1" smtClean="0"/>
-              <a:t>als</a:t>
-            </a:r>
-            <a:r>
-              <a:rPr lang="en-US" dirty="0" smtClean="0"/>
-              <a:t> singleton Design Pattern</a:t>
-            </a:r>
-          </a:p>
-          <a:p>
-            <a:r>
-              <a:rPr lang="en-US" dirty="0" err="1" smtClean="0"/>
-              <a:t>Verringert</a:t>
-            </a:r>
-            <a:r>
-              <a:rPr lang="en-US" dirty="0"/>
-              <a:t> </a:t>
-            </a:r>
-            <a:r>
-              <a:rPr lang="en-US" dirty="0" err="1" smtClean="0"/>
-              <a:t>Abhängigkeiten</a:t>
-            </a:r>
-            <a:endParaRPr lang="en-US" dirty="0"/>
-          </a:p>
-          <a:p>
-            <a:r>
-              <a:rPr lang="en-US" dirty="0" err="1" smtClean="0"/>
-              <a:t>Datenpool</a:t>
-            </a:r>
-            <a:r>
-              <a:rPr lang="en-US" dirty="0" smtClean="0"/>
-              <a:t> </a:t>
-            </a:r>
-            <a:r>
-              <a:rPr lang="en-US" dirty="0" err="1" smtClean="0"/>
-              <a:t>wird</a:t>
-            </a:r>
-            <a:r>
-              <a:rPr lang="en-US" dirty="0" smtClean="0"/>
-              <a:t> </a:t>
-            </a:r>
-            <a:r>
-              <a:rPr lang="en-US" dirty="0" err="1" smtClean="0"/>
-              <a:t>nur</a:t>
-            </a:r>
-            <a:r>
-              <a:rPr lang="en-US" dirty="0" smtClean="0"/>
-              <a:t> 1x </a:t>
-            </a:r>
-            <a:r>
-              <a:rPr lang="en-US" dirty="0" err="1" smtClean="0"/>
-              <a:t>eingelesen</a:t>
-            </a:r>
-            <a:endParaRPr lang="en-US" dirty="0" smtClean="0"/>
-          </a:p>
-          <a:p>
-            <a:r>
-              <a:rPr lang="en-US" dirty="0" err="1" smtClean="0"/>
-              <a:t>Programmablauf</a:t>
-            </a:r>
-            <a:r>
-              <a:rPr lang="en-US" dirty="0" smtClean="0"/>
-              <a:t> State Event </a:t>
-            </a:r>
-            <a:r>
-              <a:rPr lang="en-US" dirty="0" err="1" smtClean="0"/>
-              <a:t>basiert</a:t>
-            </a:r>
-            <a:r>
-              <a:rPr lang="en-US" dirty="0" smtClean="0"/>
-              <a:t>	</a:t>
-            </a:r>
-          </a:p>
-          <a:p>
-            <a:r>
-              <a:rPr lang="en-US" dirty="0" err="1" smtClean="0"/>
-              <a:t>KeyMaps</a:t>
-            </a:r>
-            <a:r>
-              <a:rPr lang="en-US" dirty="0" smtClean="0"/>
-              <a:t> </a:t>
-            </a:r>
-            <a:r>
-              <a:rPr lang="en-US" dirty="0" err="1" smtClean="0"/>
-              <a:t>für</a:t>
-            </a:r>
-            <a:r>
-              <a:rPr lang="en-US" dirty="0" smtClean="0"/>
-              <a:t> </a:t>
-            </a:r>
-            <a:r>
-              <a:rPr lang="en-US" dirty="0" err="1" smtClean="0"/>
-              <a:t>Tastatureingabe</a:t>
-            </a:r>
-            <a:r>
-              <a:rPr lang="en-US" dirty="0" smtClean="0"/>
-              <a:t> </a:t>
-            </a:r>
-            <a:endParaRPr lang="de-CH" dirty="0" smtClean="0"/>
-          </a:p>
-        </p:txBody>
-      </p:sp>
-    </p:spTree>
-    <p:extLst>
-      <p:ext uri="{BB962C8B-B14F-4D97-AF65-F5344CB8AC3E}">
-        <p14:creationId xmlns:p14="http://schemas.microsoft.com/office/powerpoint/2010/main" val="3804586808"/>
-      </p:ext>
-    </p:extLst>
-  </p:cSld>
-  <p:clrMapOvr>
-    <a:masterClrMapping/>
-  </p:clrMapOvr>
-  <p:timing>
-    <p:tnLst>
-      <p:par>
-        <p:cTn id="1" dur="indefinite" restart="never" nodeType="tmRoot"/>
-      </p:par>
-    </p:tnLst>
-  </p:timing>
-</p:sld>
-</file>
-
 <file path=ppt/slides/slide9.xml><?xml version="1.0" encoding="utf-8"?>
 <p:sld xmlns:a="http://schemas.openxmlformats.org/drawingml/2006/main" xmlns:r="http://schemas.openxmlformats.org/officeDocument/2006/relationships" xmlns:p="http://schemas.openxmlformats.org/presentationml/2006/main">
   <p:cSld>
@@ -6070,15 +6585,7 @@
           <a:p>
             <a:r>
               <a:rPr lang="en-US" dirty="0" err="1" smtClean="0"/>
-              <a:t>Vor</a:t>
-            </a:r>
-            <a:r>
-              <a:rPr lang="en-US" dirty="0" smtClean="0"/>
-              <a:t>- und </a:t>
-            </a:r>
-            <a:r>
-              <a:rPr lang="en-US" dirty="0" err="1" smtClean="0"/>
-              <a:t>Nachteile</a:t>
+              <a:t>Unsere</a:t>
             </a:r>
             <a:r>
               <a:rPr lang="en-US" dirty="0" smtClean="0"/>
@@ -6086,7 +6593,38 @@
             </a:r>
             <a:r>
               <a:rPr lang="en-US" dirty="0" err="1" smtClean="0"/>
-              <a:t>unserer</a:t>
+              <a:t>Lösung</a:t>
+            </a:r>
+            <a:r>
+              <a:rPr lang="en-US" dirty="0"/>
+              <a:t> </a:t>
+            </a:r>
+            <a:r>
+              <a:rPr lang="en-US" dirty="0" smtClean="0"/>
+              <a:t>2</a:t>
+            </a:r>
+            <a:endParaRPr lang="de-CH" dirty="0"/>
+          </a:p>
+        </p:txBody>
+      </p:sp>
+      <p:sp>
+        <p:nvSpPr>
+          <p:cNvPr id="3" name="Inhaltsplatzhalter 2"/>
+          <p:cNvSpPr>
+            <a:spLocks noGrp="1"/>
+          </p:cNvSpPr>
+          <p:nvPr>
+            <p:ph idx="1"/>
+          </p:nvPr>
+        </p:nvSpPr>
+        <p:spPr/>
+        <p:txBody>
+          <a:bodyPr/>
+          <a:lstStyle/>
+          <a:p>
+            <a:r>
+              <a:rPr lang="en-US" dirty="0" err="1" smtClean="0"/>
+              <a:t>QuestionPool</a:t>
             </a:r>
             <a:r>
               <a:rPr lang="en-US" dirty="0" smtClean="0"/>
@@ -6094,35 +6632,27 @@
             </a:r>
             <a:r>
               <a:rPr lang="en-US" dirty="0" err="1" smtClean="0"/>
-              <a:t>Lösung</a:t>
-            </a:r>
-            <a:endParaRPr lang="de-CH" dirty="0"/>
-          </a:p>
-        </p:txBody>
-      </p:sp>
-      <p:sp>
-        <p:nvSpPr>
-          <p:cNvPr id="3" name="Inhaltsplatzhalter 2"/>
-          <p:cNvSpPr>
-            <a:spLocks noGrp="1"/>
-          </p:cNvSpPr>
-          <p:nvPr>
-            <p:ph idx="1"/>
-          </p:nvPr>
-        </p:nvSpPr>
-        <p:spPr/>
-        <p:txBody>
-          <a:bodyPr/>
-          <a:lstStyle/>
-          <a:p>
-            <a:pPr marL="0" indent="0">
-              <a:buNone/>
-            </a:pPr>
-            <a:r>
-              <a:rPr lang="en-US" b="1" dirty="0" err="1" smtClean="0"/>
-              <a:t>Vorteile</a:t>
-            </a:r>
-            <a:endParaRPr lang="de-CH" b="1" dirty="0" smtClean="0"/>
+              <a:t>als</a:t>
+            </a:r>
+            <a:r>
+              <a:rPr lang="en-US" dirty="0" smtClean="0"/>
+              <a:t> singleton Design Pattern</a:t>
+            </a:r>
+          </a:p>
+          <a:p>
+            <a:r>
+              <a:rPr lang="en-US" dirty="0" err="1" smtClean="0"/>
+              <a:t>Verringert</a:t>
+            </a:r>
+            <a:r>
+              <a:rPr lang="en-US" dirty="0"/>
+              <a:t> </a:t>
+            </a:r>
+            <a:r>
+              <a:rPr lang="en-US" dirty="0" err="1" smtClean="0"/>
+              <a:t>Abhängigkeiten</a:t>
+            </a:r>
+            <a:endParaRPr lang="en-US" dirty="0"/>
           </a:p>
           <a:p>
             <a:r>
@@ -6135,22 +6665,7 @@
             </a:r>
             <a:r>
               <a:rPr lang="en-US" dirty="0" err="1" smtClean="0"/>
-              <a:t>austauschbar</a:t>
-            </a:r>
-            <a:endParaRPr lang="en-US" dirty="0" smtClean="0"/>
-          </a:p>
-          <a:p>
-            <a:r>
-              <a:rPr lang="en-US" dirty="0" err="1" smtClean="0"/>
-              <a:t>Als</a:t>
-            </a:r>
-            <a:r>
-              <a:rPr lang="en-US" dirty="0" smtClean="0"/>
-              <a:t> Client- Server </a:t>
-            </a:r>
-            <a:r>
-              <a:rPr lang="en-US" dirty="0" err="1" smtClean="0"/>
-              <a:t>Applikation</a:t>
+              <a:t>wird</a:t>
             </a:r>
             <a:r>
               <a:rPr lang="en-US" dirty="0" smtClean="0"/>
@@ -6158,58 +6673,40 @@
             </a:r>
             <a:r>
               <a:rPr lang="en-US" dirty="0" err="1" smtClean="0"/>
-              <a:t>erweiterbar</a:t>
+              <a:t>nur</a:t>
+            </a:r>
+            <a:r>
+              <a:rPr lang="en-US" dirty="0" smtClean="0"/>
+              <a:t> 1x </a:t>
+            </a:r>
+            <a:r>
+              <a:rPr lang="en-US" dirty="0" err="1" smtClean="0"/>
+              <a:t>eingelesen</a:t>
             </a:r>
             <a:endParaRPr lang="en-US" dirty="0" smtClean="0"/>
           </a:p>
           <a:p>
             <a:r>
               <a:rPr lang="en-US" dirty="0" err="1" smtClean="0"/>
-              <a:t>Anpassbar</a:t>
+              <a:t>Programmablauf</a:t>
             </a:r>
             <a:r>
               <a:rPr lang="en-US" dirty="0" smtClean="0"/>
-              <a:t> (</a:t>
+              <a:t> State Event </a:t>
             </a:r>
             <a:r>
               <a:rPr lang="en-US" dirty="0" err="1" smtClean="0"/>
-              <a:t>Fragen</a:t>
+              <a:t>basiert</a:t>
             </a:r>
             <a:r>
               <a:rPr lang="en-US" dirty="0" smtClean="0"/>
-              <a:t>, </a:t>
-            </a:r>
+              <a:t>	</a:t>
+            </a:r>
+          </a:p>
+          <a:p>
             <a:r>
               <a:rPr lang="en-US" dirty="0" err="1" smtClean="0"/>
-              <a:t>Runden</a:t>
-            </a:r>
-            <a:r>
-              <a:rPr lang="en-US" dirty="0" smtClean="0"/>
-              <a:t>, </a:t>
-            </a:r>
-            <a:r>
-              <a:rPr lang="en-US" dirty="0" err="1" smtClean="0"/>
-              <a:t>Antworten</a:t>
-            </a:r>
-            <a:r>
-              <a:rPr lang="en-US" dirty="0" smtClean="0"/>
-              <a:t>)</a:t>
-            </a:r>
-          </a:p>
-          <a:p>
-            <a:pPr marL="0" indent="0">
-              <a:buNone/>
-            </a:pPr>
-            <a:r>
-              <a:rPr lang="en-US" b="1" dirty="0" err="1" smtClean="0"/>
-              <a:t>Nachteile</a:t>
-            </a:r>
-            <a:endParaRPr lang="en-US" b="1" dirty="0" smtClean="0"/>
-          </a:p>
-          <a:p>
-            <a:r>
-              <a:rPr lang="en-US" dirty="0" err="1" smtClean="0"/>
-              <a:t>Geringe</a:t>
+              <a:t>KeyMaps</a:t>
             </a:r>
             <a:r>
               <a:rPr lang="en-US" dirty="0" smtClean="0"/>
@@ -6217,41 +6714,34 @@
             </a:r>
             <a:r>
               <a:rPr lang="en-US" dirty="0" err="1" smtClean="0"/>
-              <a:t>Kohesion</a:t>
+              <a:t>für</a:t>
             </a:r>
             <a:r>
               <a:rPr lang="en-US" dirty="0" smtClean="0"/>
-              <a:t> von </a:t>
-            </a:r>
-            <a:r>
-              <a:rPr lang="de-DE" dirty="0" err="1" smtClean="0"/>
-              <a:t>QuizServer-Klasse</a:t>
-            </a:r>
-            <a:endParaRPr lang="de-DE" dirty="0" smtClean="0"/>
-          </a:p>
-          <a:p>
-            <a:endParaRPr lang="en-US" dirty="0" smtClean="0"/>
+              <a:t> </a:t>
+            </a:r>
+            <a:r>
+              <a:rPr lang="en-US" dirty="0" err="1" smtClean="0"/>
+              <a:t>Tastatureingabe</a:t>
+            </a:r>
+            <a:r>
+              <a:rPr lang="en-US" dirty="0" smtClean="0"/>
+              <a:t> </a:t>
+            </a:r>
+            <a:endParaRPr lang="de-CH" dirty="0" smtClean="0"/>
           </a:p>
         </p:txBody>
       </p:sp>
     </p:spTree>
     <p:extLst>
       <p:ext uri="{BB962C8B-B14F-4D97-AF65-F5344CB8AC3E}">
-        <p14:creationId xmlns:p14="http://schemas.microsoft.com/office/powerpoint/2010/main" val="3110578527"/>
+        <p14:creationId xmlns:p14="http://schemas.microsoft.com/office/powerpoint/2010/main" val="3804586808"/>
       </p:ext>
     </p:extLst>
   </p:cSld>
   <p:clrMapOvr>
     <a:masterClrMapping/>
   </p:clrMapOvr>
-  <mc:AlternateContent xmlns:mc="http://schemas.openxmlformats.org/markup-compatibility/2006" xmlns:p14="http://schemas.microsoft.com/office/powerpoint/2010/main">
-    <mc:Choice Requires="p14">
-      <p:transition spd="slow" p14:dur="2000"/>
-    </mc:Choice>
-    <mc:Fallback xmlns="">
-      <p:transition spd="slow"/>
-    </mc:Fallback>
-  </mc:AlternateContent>
   <p:timing>
     <p:tnLst>
       <p:par>

</xml_diff>

<commit_message>
removed unnecessary method and ObjectInstance; updated UML Diagramm and presentation
</commit_message>
<xml_diff>
--- a/Quizduell.pptx
+++ b/Quizduell.pptx
@@ -1727,7 +1727,15 @@
           <a:p>
             <a:r>
               <a:rPr lang="en-US" dirty="0" err="1" smtClean="0"/>
-              <a:t>Vereinfacht</a:t>
+              <a:t>Zuerst</a:t>
+            </a:r>
+            <a:r>
+              <a:rPr lang="en-US" dirty="0" smtClean="0"/>
+              <a:t> </a:t>
+            </a:r>
+            <a:r>
+              <a:rPr lang="en-US" dirty="0" err="1" smtClean="0"/>
+              <a:t>statisch</a:t>
             </a:r>
             <a:r>
               <a:rPr lang="en-US" dirty="0" smtClean="0"/>
@@ -1735,6 +1743,29 @@
             </a:r>
             <a:r>
               <a:rPr lang="en-US" dirty="0" err="1" smtClean="0"/>
+              <a:t>dann</a:t>
+            </a:r>
+            <a:r>
+              <a:rPr lang="en-US" dirty="0" smtClean="0"/>
+              <a:t> </a:t>
+            </a:r>
+            <a:r>
+              <a:rPr lang="en-US" dirty="0" err="1" smtClean="0"/>
+              <a:t>dynamisch</a:t>
+            </a:r>
+            <a:endParaRPr lang="en-US" dirty="0" smtClean="0"/>
+          </a:p>
+          <a:p>
+            <a:r>
+              <a:rPr lang="en-US" dirty="0" err="1" smtClean="0"/>
+              <a:t>Vereinfacht</a:t>
+            </a:r>
+            <a:r>
+              <a:rPr lang="en-US" dirty="0" smtClean="0"/>
+              <a:t> – </a:t>
+            </a:r>
+            <a:r>
+              <a:rPr lang="en-US" dirty="0" err="1" smtClean="0"/>
               <a:t>nicht</a:t>
             </a:r>
             <a:r>
@@ -1777,65 +1808,6 @@
               <a:rPr lang="en-US" baseline="0" dirty="0" smtClean="0"/>
               <a:t>)</a:t>
             </a:r>
-          </a:p>
-          <a:p>
-            <a:r>
-              <a:rPr lang="en-US" baseline="0" dirty="0" err="1" smtClean="0"/>
-              <a:t>Abhängigkeit</a:t>
-            </a:r>
-            <a:r>
-              <a:rPr lang="en-US" baseline="0" dirty="0" smtClean="0"/>
-              <a:t> </a:t>
-            </a:r>
-            <a:r>
-              <a:rPr lang="en-US" baseline="0" dirty="0" err="1" smtClean="0"/>
-              <a:t>Simular</a:t>
-            </a:r>
-            <a:r>
-              <a:rPr lang="en-US" baseline="0" dirty="0" smtClean="0"/>
-              <a:t> – </a:t>
-            </a:r>
-            <a:r>
-              <a:rPr lang="en-US" baseline="0" dirty="0" err="1" smtClean="0"/>
-              <a:t>quizes</a:t>
-            </a:r>
-            <a:r>
-              <a:rPr lang="en-US" baseline="0" dirty="0" smtClean="0"/>
-              <a:t>  / players </a:t>
-            </a:r>
-            <a:r>
-              <a:rPr lang="en-US" baseline="0" dirty="0" err="1" smtClean="0"/>
-              <a:t>nicht</a:t>
-            </a:r>
-            <a:r>
-              <a:rPr lang="en-US" baseline="0" dirty="0" smtClean="0"/>
-              <a:t> </a:t>
-            </a:r>
-            <a:r>
-              <a:rPr lang="en-US" baseline="0" dirty="0" err="1" smtClean="0"/>
-              <a:t>eingezeichnet</a:t>
-            </a:r>
-            <a:r>
-              <a:rPr lang="en-US" baseline="0" dirty="0" smtClean="0"/>
-              <a:t> (</a:t>
-            </a:r>
-            <a:r>
-              <a:rPr lang="en-US" baseline="0" dirty="0" err="1" smtClean="0"/>
-              <a:t>aus</a:t>
-            </a:r>
-            <a:r>
-              <a:rPr lang="en-US" baseline="0" dirty="0" smtClean="0"/>
-              <a:t> </a:t>
-            </a:r>
-            <a:r>
-              <a:rPr lang="en-US" baseline="0" dirty="0" err="1" smtClean="0"/>
-              <a:t>übersichtlichkeitsgründen</a:t>
-            </a:r>
-            <a:r>
-              <a:rPr lang="en-US" baseline="0" dirty="0" smtClean="0"/>
-              <a:t>)</a:t>
-            </a:r>
-            <a:endParaRPr lang="de-CH" dirty="0"/>
           </a:p>
         </p:txBody>
       </p:sp>
@@ -2536,7 +2508,6 @@
               <a:rPr lang="en-US" baseline="0" dirty="0" smtClean="0"/>
               <a:t>.</a:t>
             </a:r>
-            <a:endParaRPr lang="en-US" baseline="0" dirty="0" smtClean="0"/>
           </a:p>
           <a:p>
             <a:endParaRPr lang="de-CH" dirty="0"/>
@@ -6460,15 +6431,7 @@
           <a:p>
             <a:r>
               <a:rPr lang="de-CH" dirty="0" smtClean="0"/>
-              <a:t>Vor- </a:t>
-            </a:r>
-            <a:r>
-              <a:rPr lang="de-CH" dirty="0" smtClean="0"/>
-              <a:t>und Nachteile unserer </a:t>
-            </a:r>
-            <a:r>
-              <a:rPr lang="de-CH" dirty="0" smtClean="0"/>
-              <a:t>Lösung</a:t>
+              <a:t>Vor- und Nachteile unserer Lösung</a:t>
             </a:r>
           </a:p>
           <a:p>
@@ -6476,7 +6439,6 @@
               <a:rPr lang="de-CH" dirty="0" smtClean="0"/>
               <a:t>Demonstration</a:t>
             </a:r>
-            <a:endParaRPr lang="de-CH" dirty="0" smtClean="0"/>
           </a:p>
           <a:p>
             <a:r>
@@ -6601,11 +6563,7 @@
           <a:p>
             <a:r>
               <a:rPr lang="en-US" dirty="0" err="1" smtClean="0"/>
-              <a:t>Runden</a:t>
-            </a:r>
-            <a:r>
-              <a:rPr lang="en-US" dirty="0" err="1" smtClean="0"/>
-              <a:t>basierter</a:t>
+              <a:t>Rundenbasierter</a:t>
             </a:r>
             <a:r>
               <a:rPr lang="en-US" dirty="0" smtClean="0"/>
@@ -6814,7 +6772,6 @@
               <a:rPr lang="en-US" dirty="0" smtClean="0"/>
               <a:t> </a:t>
             </a:r>
-            <a:endParaRPr lang="en-US" dirty="0" smtClean="0"/>
           </a:p>
           <a:p>
             <a:pPr lvl="1"/>
@@ -6944,7 +6901,7 @@
       </p:sp>
       <p:sp>
         <p:nvSpPr>
-          <p:cNvPr id="3" name="Inhaltsplatzhalter 2"/>
+          <p:cNvPr id="4" name="Inhaltsplatzhalter 3"/>
           <p:cNvSpPr>
             <a:spLocks noGrp="1"/>
           </p:cNvSpPr>
@@ -6957,16 +6914,13 @@
           <a:bodyPr/>
           <a:lstStyle/>
           <a:p>
-            <a:pPr marL="0" indent="0">
-              <a:buNone/>
-            </a:pPr>
-            <a:endParaRPr lang="de-CH" dirty="0"/>
+            <a:endParaRPr lang="de-CH"/>
           </a:p>
         </p:txBody>
       </p:sp>
       <p:pic>
         <p:nvPicPr>
-          <p:cNvPr id="3075" name="Picture 3" descr="C:\Users\James\SkyDrive\Bfh\programmierung2\presentation\classDiagramm.PNG"/>
+          <p:cNvPr id="1028" name="Picture 4" descr="C:\Users\James\SkyDrive\Bfh\programmierung2\presentation\classDiagramm_update.png"/>
           <p:cNvPicPr>
             <a:picLocks noChangeAspect="1" noChangeArrowheads="1"/>
           </p:cNvPicPr>
@@ -6987,8 +6941,8 @@
         </p:blipFill>
         <p:spPr bwMode="auto">
           <a:xfrm>
-            <a:off x="467544" y="260648"/>
-            <a:ext cx="8496944" cy="6583725"/>
+            <a:off x="35496" y="260648"/>
+            <a:ext cx="9073008" cy="6065954"/>
           </a:xfrm>
           <a:prstGeom prst="rect">
             <a:avLst/>
@@ -7590,11 +7544,7 @@
             </a:r>
             <a:r>
               <a:rPr lang="en-US" dirty="0" smtClean="0"/>
-              <a:t> </a:t>
-            </a:r>
-            <a:r>
-              <a:rPr lang="en-US" dirty="0" smtClean="0"/>
-              <a:t>1x </a:t>
+              <a:t> 1x </a:t>
             </a:r>
             <a:r>
               <a:rPr lang="en-US" dirty="0" err="1" smtClean="0"/>
@@ -7658,11 +7608,7 @@
             </a:r>
             <a:r>
               <a:rPr lang="en-US" dirty="0" smtClean="0"/>
-              <a:t> CSV </a:t>
-            </a:r>
-            <a:r>
-              <a:rPr lang="en-US" dirty="0" smtClean="0"/>
-              <a:t> </a:t>
+              <a:t> CSV  </a:t>
             </a:r>
           </a:p>
         </p:txBody>

</xml_diff>